<commit_message>
SLides update and responsive css/js for matchmaker
</commit_message>
<xml_diff>
--- a/Week06_Responsive/Lesson 12/Slides_12.pptx
+++ b/Week06_Responsive/Lesson 12/Slides_12.pptx
@@ -292,7 +292,7 @@
           <a:p>
             <a:fld id="{CB0251C5-6705-4872-B952-0E9E40DE7B47}" type="datetimeFigureOut">
               <a:rPr lang="en-US" smtClean="0"/>
-              <a:t>9/4/2013</a:t>
+              <a:t>9/5/2013</a:t>
             </a:fld>
             <a:endParaRPr lang="en-US"/>
           </a:p>
@@ -462,7 +462,7 @@
           <a:p>
             <a:fld id="{CB0251C5-6705-4872-B952-0E9E40DE7B47}" type="datetimeFigureOut">
               <a:rPr lang="en-US" smtClean="0"/>
-              <a:t>9/4/2013</a:t>
+              <a:t>9/5/2013</a:t>
             </a:fld>
             <a:endParaRPr lang="en-US"/>
           </a:p>
@@ -642,7 +642,7 @@
           <a:p>
             <a:fld id="{CB0251C5-6705-4872-B952-0E9E40DE7B47}" type="datetimeFigureOut">
               <a:rPr lang="en-US" smtClean="0"/>
-              <a:t>9/4/2013</a:t>
+              <a:t>9/5/2013</a:t>
             </a:fld>
             <a:endParaRPr lang="en-US"/>
           </a:p>
@@ -812,7 +812,7 @@
           <a:p>
             <a:fld id="{CB0251C5-6705-4872-B952-0E9E40DE7B47}" type="datetimeFigureOut">
               <a:rPr lang="en-US" smtClean="0"/>
-              <a:t>9/4/2013</a:t>
+              <a:t>9/5/2013</a:t>
             </a:fld>
             <a:endParaRPr lang="en-US"/>
           </a:p>
@@ -1058,7 +1058,7 @@
           <a:p>
             <a:fld id="{CB0251C5-6705-4872-B952-0E9E40DE7B47}" type="datetimeFigureOut">
               <a:rPr lang="en-US" smtClean="0"/>
-              <a:t>9/4/2013</a:t>
+              <a:t>9/5/2013</a:t>
             </a:fld>
             <a:endParaRPr lang="en-US"/>
           </a:p>
@@ -1346,7 +1346,7 @@
           <a:p>
             <a:fld id="{CB0251C5-6705-4872-B952-0E9E40DE7B47}" type="datetimeFigureOut">
               <a:rPr lang="en-US" smtClean="0"/>
-              <a:t>9/4/2013</a:t>
+              <a:t>9/5/2013</a:t>
             </a:fld>
             <a:endParaRPr lang="en-US"/>
           </a:p>
@@ -1768,7 +1768,7 @@
           <a:p>
             <a:fld id="{CB0251C5-6705-4872-B952-0E9E40DE7B47}" type="datetimeFigureOut">
               <a:rPr lang="en-US" smtClean="0"/>
-              <a:t>9/4/2013</a:t>
+              <a:t>9/5/2013</a:t>
             </a:fld>
             <a:endParaRPr lang="en-US"/>
           </a:p>
@@ -1886,7 +1886,7 @@
           <a:p>
             <a:fld id="{CB0251C5-6705-4872-B952-0E9E40DE7B47}" type="datetimeFigureOut">
               <a:rPr lang="en-US" smtClean="0"/>
-              <a:t>9/4/2013</a:t>
+              <a:t>9/5/2013</a:t>
             </a:fld>
             <a:endParaRPr lang="en-US"/>
           </a:p>
@@ -1981,7 +1981,7 @@
           <a:p>
             <a:fld id="{CB0251C5-6705-4872-B952-0E9E40DE7B47}" type="datetimeFigureOut">
               <a:rPr lang="en-US" smtClean="0"/>
-              <a:t>9/4/2013</a:t>
+              <a:t>9/5/2013</a:t>
             </a:fld>
             <a:endParaRPr lang="en-US"/>
           </a:p>
@@ -2258,7 +2258,7 @@
           <a:p>
             <a:fld id="{CB0251C5-6705-4872-B952-0E9E40DE7B47}" type="datetimeFigureOut">
               <a:rPr lang="en-US" smtClean="0"/>
-              <a:t>9/4/2013</a:t>
+              <a:t>9/5/2013</a:t>
             </a:fld>
             <a:endParaRPr lang="en-US"/>
           </a:p>
@@ -2511,7 +2511,7 @@
           <a:p>
             <a:fld id="{CB0251C5-6705-4872-B952-0E9E40DE7B47}" type="datetimeFigureOut">
               <a:rPr lang="en-US" smtClean="0"/>
-              <a:t>9/4/2013</a:t>
+              <a:t>9/5/2013</a:t>
             </a:fld>
             <a:endParaRPr lang="en-US"/>
           </a:p>
@@ -2724,7 +2724,7 @@
           <a:p>
             <a:fld id="{CB0251C5-6705-4872-B952-0E9E40DE7B47}" type="datetimeFigureOut">
               <a:rPr lang="en-US" smtClean="0"/>
-              <a:t>9/4/2013</a:t>
+              <a:t>9/5/2013</a:t>
             </a:fld>
             <a:endParaRPr lang="en-US"/>
           </a:p>
@@ -3211,8 +3211,23 @@
           <a:p>
             <a:r>
               <a:rPr lang="en-US" dirty="0" smtClean="0"/>
-              <a:t>Convert widths to percentages</a:t>
-            </a:r>
+              <a:t>Convert widths to </a:t>
+            </a:r>
+            <a:r>
+              <a:rPr lang="en-US" dirty="0" smtClean="0"/>
+              <a:t>percentages</a:t>
+            </a:r>
+          </a:p>
+          <a:p>
+            <a:r>
+              <a:rPr lang="en-US" dirty="0" smtClean="0"/>
+              <a:t>Size fonts </a:t>
+            </a:r>
+            <a:r>
+              <a:rPr lang="en-US" smtClean="0"/>
+              <a:t>in ems</a:t>
+            </a:r>
+            <a:endParaRPr lang="en-US" dirty="0" smtClean="0"/>
           </a:p>
           <a:p>
             <a:r>

</xml_diff>